<commit_message>
jk actually finalized L1 now
</commit_message>
<xml_diff>
--- a/Lecture1_Intro.pptx
+++ b/Lecture1_Intro.pptx
@@ -7,9 +7,9 @@
   <p:sldIdLst>
     <p:sldId id="256" r:id="rId2"/>
     <p:sldId id="257" r:id="rId3"/>
-    <p:sldId id="259" r:id="rId4"/>
-    <p:sldId id="260" r:id="rId5"/>
-    <p:sldId id="261" r:id="rId6"/>
+    <p:sldId id="261" r:id="rId4"/>
+    <p:sldId id="259" r:id="rId5"/>
+    <p:sldId id="260" r:id="rId6"/>
     <p:sldId id="262" r:id="rId7"/>
     <p:sldId id="269" r:id="rId8"/>
   </p:sldIdLst>
@@ -310,7 +310,7 @@
           <a:p>
             <a:fld id="{0B2B5188-48E4-CB4E-AD28-7E0EA7102CE2}" type="datetimeFigureOut">
               <a:rPr lang="en-US" smtClean="0"/>
-              <a:t>3/21/2019</a:t>
+              <a:t>4/10/2019</a:t>
             </a:fld>
             <a:endParaRPr lang="en-US"/>
           </a:p>
@@ -480,7 +480,7 @@
           <a:p>
             <a:fld id="{0B2B5188-48E4-CB4E-AD28-7E0EA7102CE2}" type="datetimeFigureOut">
               <a:rPr lang="en-US" smtClean="0"/>
-              <a:t>3/21/2019</a:t>
+              <a:t>4/10/2019</a:t>
             </a:fld>
             <a:endParaRPr lang="en-US"/>
           </a:p>
@@ -660,7 +660,7 @@
           <a:p>
             <a:fld id="{0B2B5188-48E4-CB4E-AD28-7E0EA7102CE2}" type="datetimeFigureOut">
               <a:rPr lang="en-US" smtClean="0"/>
-              <a:t>3/21/2019</a:t>
+              <a:t>4/10/2019</a:t>
             </a:fld>
             <a:endParaRPr lang="en-US"/>
           </a:p>
@@ -830,7 +830,7 @@
           <a:p>
             <a:fld id="{0B2B5188-48E4-CB4E-AD28-7E0EA7102CE2}" type="datetimeFigureOut">
               <a:rPr lang="en-US" smtClean="0"/>
-              <a:t>3/21/2019</a:t>
+              <a:t>4/10/2019</a:t>
             </a:fld>
             <a:endParaRPr lang="en-US"/>
           </a:p>
@@ -1076,7 +1076,7 @@
           <a:p>
             <a:fld id="{0B2B5188-48E4-CB4E-AD28-7E0EA7102CE2}" type="datetimeFigureOut">
               <a:rPr lang="en-US" smtClean="0"/>
-              <a:t>3/21/2019</a:t>
+              <a:t>4/10/2019</a:t>
             </a:fld>
             <a:endParaRPr lang="en-US"/>
           </a:p>
@@ -1364,7 +1364,7 @@
           <a:p>
             <a:fld id="{0B2B5188-48E4-CB4E-AD28-7E0EA7102CE2}" type="datetimeFigureOut">
               <a:rPr lang="en-US" smtClean="0"/>
-              <a:t>3/21/2019</a:t>
+              <a:t>4/10/2019</a:t>
             </a:fld>
             <a:endParaRPr lang="en-US"/>
           </a:p>
@@ -1786,7 +1786,7 @@
           <a:p>
             <a:fld id="{0B2B5188-48E4-CB4E-AD28-7E0EA7102CE2}" type="datetimeFigureOut">
               <a:rPr lang="en-US" smtClean="0"/>
-              <a:t>3/21/2019</a:t>
+              <a:t>4/10/2019</a:t>
             </a:fld>
             <a:endParaRPr lang="en-US"/>
           </a:p>
@@ -1904,7 +1904,7 @@
           <a:p>
             <a:fld id="{0B2B5188-48E4-CB4E-AD28-7E0EA7102CE2}" type="datetimeFigureOut">
               <a:rPr lang="en-US" smtClean="0"/>
-              <a:t>3/21/2019</a:t>
+              <a:t>4/10/2019</a:t>
             </a:fld>
             <a:endParaRPr lang="en-US"/>
           </a:p>
@@ -1999,7 +1999,7 @@
           <a:p>
             <a:fld id="{0B2B5188-48E4-CB4E-AD28-7E0EA7102CE2}" type="datetimeFigureOut">
               <a:rPr lang="en-US" smtClean="0"/>
-              <a:t>3/21/2019</a:t>
+              <a:t>4/10/2019</a:t>
             </a:fld>
             <a:endParaRPr lang="en-US"/>
           </a:p>
@@ -2276,7 +2276,7 @@
           <a:p>
             <a:fld id="{0B2B5188-48E4-CB4E-AD28-7E0EA7102CE2}" type="datetimeFigureOut">
               <a:rPr lang="en-US" smtClean="0"/>
-              <a:t>3/21/2019</a:t>
+              <a:t>4/10/2019</a:t>
             </a:fld>
             <a:endParaRPr lang="en-US"/>
           </a:p>
@@ -2529,7 +2529,7 @@
           <a:p>
             <a:fld id="{0B2B5188-48E4-CB4E-AD28-7E0EA7102CE2}" type="datetimeFigureOut">
               <a:rPr lang="en-US" smtClean="0"/>
-              <a:t>3/21/2019</a:t>
+              <a:t>4/10/2019</a:t>
             </a:fld>
             <a:endParaRPr lang="en-US"/>
           </a:p>
@@ -2742,7 +2742,7 @@
           <a:p>
             <a:fld id="{0B2B5188-48E4-CB4E-AD28-7E0EA7102CE2}" type="datetimeFigureOut">
               <a:rPr lang="en-US" smtClean="0"/>
-              <a:t>3/21/2019</a:t>
+              <a:t>4/10/2019</a:t>
             </a:fld>
             <a:endParaRPr lang="en-US"/>
           </a:p>
@@ -3303,6 +3303,437 @@
       </p:grpSpPr>
       <p:sp>
         <p:nvSpPr>
+          <p:cNvPr id="2" name="Title 1"/>
+          <p:cNvSpPr>
+            <a:spLocks noGrp="1"/>
+          </p:cNvSpPr>
+          <p:nvPr>
+            <p:ph type="title"/>
+          </p:nvPr>
+        </p:nvSpPr>
+        <p:spPr>
+          <a:xfrm>
+            <a:off x="0" y="0"/>
+            <a:ext cx="8229600" cy="1143000"/>
+          </a:xfrm>
+        </p:spPr>
+        <p:txBody>
+          <a:bodyPr anchor="t">
+            <a:normAutofit/>
+          </a:bodyPr>
+          <a:lstStyle/>
+          <a:p>
+            <a:pPr algn="l"/>
+            <a:r>
+              <a:rPr lang="en-US" sz="3600" dirty="0" smtClean="0"/>
+              <a:t>Analysis is About Abstraction</a:t>
+            </a:r>
+            <a:endParaRPr lang="en-US" sz="3600" dirty="0"/>
+          </a:p>
+        </p:txBody>
+      </p:sp>
+      <p:sp>
+        <p:nvSpPr>
+          <p:cNvPr id="3" name="Content Placeholder 2"/>
+          <p:cNvSpPr>
+            <a:spLocks noGrp="1"/>
+          </p:cNvSpPr>
+          <p:nvPr>
+            <p:ph idx="1"/>
+          </p:nvPr>
+        </p:nvSpPr>
+        <p:spPr>
+          <a:xfrm>
+            <a:off x="457200" y="1600200"/>
+            <a:ext cx="8229600" cy="5257800"/>
+          </a:xfrm>
+        </p:spPr>
+        <p:txBody>
+          <a:bodyPr>
+            <a:normAutofit/>
+          </a:bodyPr>
+          <a:lstStyle/>
+          <a:p>
+            <a:pPr marL="457200" lvl="1" indent="0">
+              <a:buNone/>
+            </a:pPr>
+            <a:endParaRPr lang="en-US" sz="1800" dirty="0"/>
+          </a:p>
+          <a:p>
+            <a:r>
+              <a:rPr lang="en-US" sz="2000" dirty="0" smtClean="0"/>
+              <a:t>A variable is an abstraction:</a:t>
+            </a:r>
+          </a:p>
+          <a:p>
+            <a:pPr lvl="1"/>
+            <a:r>
+              <a:rPr lang="en-US" sz="1800" dirty="0" smtClean="0"/>
+              <a:t>We don’t want to think about a variable’s contents when we work with data</a:t>
+            </a:r>
+          </a:p>
+          <a:p>
+            <a:pPr lvl="2">
+              <a:buNone/>
+            </a:pPr>
+            <a:r>
+              <a:rPr lang="en-US" sz="1600" dirty="0" smtClean="0"/>
+              <a:t>e.g. </a:t>
+            </a:r>
+            <a:r>
+              <a:rPr lang="en-US" sz="1600" dirty="0" err="1" smtClean="0"/>
+              <a:t>spikewaveforms</a:t>
+            </a:r>
+            <a:r>
+              <a:rPr lang="en-US" sz="1600" dirty="0" smtClean="0"/>
+              <a:t>=</a:t>
+            </a:r>
+            <a:r>
+              <a:rPr lang="en-US" sz="1600" dirty="0" err="1" smtClean="0"/>
+              <a:t>loadwaveforms</a:t>
+            </a:r>
+            <a:r>
+              <a:rPr lang="en-US" sz="1600" dirty="0" smtClean="0"/>
+              <a:t>(</a:t>
+            </a:r>
+            <a:r>
+              <a:rPr lang="en-US" sz="1600" dirty="0" err="1" smtClean="0"/>
+              <a:t>spikedata</a:t>
+            </a:r>
+            <a:r>
+              <a:rPr lang="en-US" sz="1600" dirty="0" smtClean="0"/>
+              <a:t>);</a:t>
+            </a:r>
+          </a:p>
+          <a:p>
+            <a:pPr lvl="2"/>
+            <a:endParaRPr lang="en-US" sz="1600" dirty="0"/>
+          </a:p>
+          <a:p>
+            <a:r>
+              <a:rPr lang="en-US" sz="2000" dirty="0" smtClean="0"/>
+              <a:t>A function is an abstraction:</a:t>
+            </a:r>
+          </a:p>
+          <a:p>
+            <a:pPr lvl="1"/>
+            <a:r>
+              <a:rPr lang="en-US" sz="1800" dirty="0" smtClean="0"/>
+              <a:t>We don’t want to think about math when we perform an operation</a:t>
+            </a:r>
+          </a:p>
+          <a:p>
+            <a:pPr lvl="2">
+              <a:buNone/>
+            </a:pPr>
+            <a:r>
+              <a:rPr lang="en-US" sz="1600" dirty="0" smtClean="0"/>
+              <a:t>e.g. </a:t>
+            </a:r>
+            <a:r>
+              <a:rPr lang="en-US" sz="1600" dirty="0" err="1" smtClean="0"/>
+              <a:t>compute_place_fields</a:t>
+            </a:r>
+            <a:r>
+              <a:rPr lang="en-US" sz="1600" dirty="0" smtClean="0"/>
+              <a:t>(</a:t>
+            </a:r>
+            <a:r>
+              <a:rPr lang="en-US" sz="1600" dirty="0" err="1" smtClean="0"/>
+              <a:t>spikewaveforms</a:t>
+            </a:r>
+            <a:r>
+              <a:rPr lang="en-US" sz="1600" dirty="0" smtClean="0"/>
+              <a:t>)</a:t>
+            </a:r>
+            <a:endParaRPr lang="en-US" sz="2000" dirty="0"/>
+          </a:p>
+        </p:txBody>
+      </p:sp>
+    </p:spTree>
+    <p:extLst>
+      <p:ext uri="{BB962C8B-B14F-4D97-AF65-F5344CB8AC3E}">
+        <p14:creationId xmlns:p14="http://schemas.microsoft.com/office/powerpoint/2010/main" val="3582270256"/>
+      </p:ext>
+    </p:extLst>
+  </p:cSld>
+  <p:clrMapOvr>
+    <a:masterClrMapping/>
+  </p:clrMapOvr>
+  <p:timing>
+    <p:tnLst>
+      <p:par>
+        <p:cTn id="1" dur="indefinite" restart="never" nodeType="tmRoot">
+          <p:childTnLst>
+            <p:seq concurrent="1" nextAc="seek">
+              <p:cTn id="2" dur="indefinite" nodeType="mainSeq">
+                <p:childTnLst>
+                  <p:par>
+                    <p:cTn id="3" fill="hold">
+                      <p:stCondLst>
+                        <p:cond delay="indefinite"/>
+                      </p:stCondLst>
+                      <p:childTnLst>
+                        <p:par>
+                          <p:cTn id="4" fill="hold">
+                            <p:stCondLst>
+                              <p:cond delay="0"/>
+                            </p:stCondLst>
+                            <p:childTnLst>
+                              <p:par>
+                                <p:cTn id="5" presetID="1" presetClass="entr" presetSubtype="0" fill="hold" nodeType="clickEffect">
+                                  <p:stCondLst>
+                                    <p:cond delay="0"/>
+                                  </p:stCondLst>
+                                  <p:childTnLst>
+                                    <p:set>
+                                      <p:cBhvr>
+                                        <p:cTn id="6" dur="1" fill="hold">
+                                          <p:stCondLst>
+                                            <p:cond delay="0"/>
+                                          </p:stCondLst>
+                                        </p:cTn>
+                                        <p:tgtEl>
+                                          <p:spTgt spid="3">
+                                            <p:txEl>
+                                              <p:pRg st="1" end="1"/>
+                                            </p:txEl>
+                                          </p:spTgt>
+                                        </p:tgtEl>
+                                        <p:attrNameLst>
+                                          <p:attrName>style.visibility</p:attrName>
+                                        </p:attrNameLst>
+                                      </p:cBhvr>
+                                      <p:to>
+                                        <p:strVal val="visible"/>
+                                      </p:to>
+                                    </p:set>
+                                  </p:childTnLst>
+                                </p:cTn>
+                              </p:par>
+                              <p:par>
+                                <p:cTn id="7" presetID="1" presetClass="entr" presetSubtype="0" fill="hold" nodeType="withEffect">
+                                  <p:stCondLst>
+                                    <p:cond delay="0"/>
+                                  </p:stCondLst>
+                                  <p:childTnLst>
+                                    <p:set>
+                                      <p:cBhvr>
+                                        <p:cTn id="8" dur="1" fill="hold">
+                                          <p:stCondLst>
+                                            <p:cond delay="0"/>
+                                          </p:stCondLst>
+                                        </p:cTn>
+                                        <p:tgtEl>
+                                          <p:spTgt spid="3">
+                                            <p:txEl>
+                                              <p:pRg st="2" end="2"/>
+                                            </p:txEl>
+                                          </p:spTgt>
+                                        </p:tgtEl>
+                                        <p:attrNameLst>
+                                          <p:attrName>style.visibility</p:attrName>
+                                        </p:attrNameLst>
+                                      </p:cBhvr>
+                                      <p:to>
+                                        <p:strVal val="visible"/>
+                                      </p:to>
+                                    </p:set>
+                                  </p:childTnLst>
+                                </p:cTn>
+                              </p:par>
+                              <p:par>
+                                <p:cTn id="9" presetID="1" presetClass="entr" presetSubtype="0" fill="hold" nodeType="withEffect">
+                                  <p:stCondLst>
+                                    <p:cond delay="0"/>
+                                  </p:stCondLst>
+                                  <p:childTnLst>
+                                    <p:set>
+                                      <p:cBhvr>
+                                        <p:cTn id="10" dur="1" fill="hold">
+                                          <p:stCondLst>
+                                            <p:cond delay="0"/>
+                                          </p:stCondLst>
+                                        </p:cTn>
+                                        <p:tgtEl>
+                                          <p:spTgt spid="3">
+                                            <p:txEl>
+                                              <p:pRg st="3" end="3"/>
+                                            </p:txEl>
+                                          </p:spTgt>
+                                        </p:tgtEl>
+                                        <p:attrNameLst>
+                                          <p:attrName>style.visibility</p:attrName>
+                                        </p:attrNameLst>
+                                      </p:cBhvr>
+                                      <p:to>
+                                        <p:strVal val="visible"/>
+                                      </p:to>
+                                    </p:set>
+                                  </p:childTnLst>
+                                </p:cTn>
+                              </p:par>
+                            </p:childTnLst>
+                          </p:cTn>
+                        </p:par>
+                      </p:childTnLst>
+                    </p:cTn>
+                  </p:par>
+                  <p:par>
+                    <p:cTn id="11" fill="hold">
+                      <p:stCondLst>
+                        <p:cond delay="indefinite"/>
+                      </p:stCondLst>
+                      <p:childTnLst>
+                        <p:par>
+                          <p:cTn id="12" fill="hold">
+                            <p:stCondLst>
+                              <p:cond delay="0"/>
+                            </p:stCondLst>
+                            <p:childTnLst>
+                              <p:par>
+                                <p:cTn id="13" presetID="1" presetClass="entr" presetSubtype="0" fill="hold" nodeType="clickEffect">
+                                  <p:stCondLst>
+                                    <p:cond delay="0"/>
+                                  </p:stCondLst>
+                                  <p:childTnLst>
+                                    <p:set>
+                                      <p:cBhvr>
+                                        <p:cTn id="14" dur="1" fill="hold">
+                                          <p:stCondLst>
+                                            <p:cond delay="0"/>
+                                          </p:stCondLst>
+                                        </p:cTn>
+                                        <p:tgtEl>
+                                          <p:spTgt spid="3">
+                                            <p:txEl>
+                                              <p:pRg st="5" end="5"/>
+                                            </p:txEl>
+                                          </p:spTgt>
+                                        </p:tgtEl>
+                                        <p:attrNameLst>
+                                          <p:attrName>style.visibility</p:attrName>
+                                        </p:attrNameLst>
+                                      </p:cBhvr>
+                                      <p:to>
+                                        <p:strVal val="visible"/>
+                                      </p:to>
+                                    </p:set>
+                                  </p:childTnLst>
+                                </p:cTn>
+                              </p:par>
+                              <p:par>
+                                <p:cTn id="15" presetID="1" presetClass="entr" presetSubtype="0" fill="hold" nodeType="withEffect">
+                                  <p:stCondLst>
+                                    <p:cond delay="0"/>
+                                  </p:stCondLst>
+                                  <p:childTnLst>
+                                    <p:set>
+                                      <p:cBhvr>
+                                        <p:cTn id="16" dur="1" fill="hold">
+                                          <p:stCondLst>
+                                            <p:cond delay="0"/>
+                                          </p:stCondLst>
+                                        </p:cTn>
+                                        <p:tgtEl>
+                                          <p:spTgt spid="3">
+                                            <p:txEl>
+                                              <p:pRg st="6" end="6"/>
+                                            </p:txEl>
+                                          </p:spTgt>
+                                        </p:tgtEl>
+                                        <p:attrNameLst>
+                                          <p:attrName>style.visibility</p:attrName>
+                                        </p:attrNameLst>
+                                      </p:cBhvr>
+                                      <p:to>
+                                        <p:strVal val="visible"/>
+                                      </p:to>
+                                    </p:set>
+                                  </p:childTnLst>
+                                </p:cTn>
+                              </p:par>
+                              <p:par>
+                                <p:cTn id="17" presetID="1" presetClass="entr" presetSubtype="0" fill="hold" nodeType="withEffect">
+                                  <p:stCondLst>
+                                    <p:cond delay="0"/>
+                                  </p:stCondLst>
+                                  <p:childTnLst>
+                                    <p:set>
+                                      <p:cBhvr>
+                                        <p:cTn id="18" dur="1" fill="hold">
+                                          <p:stCondLst>
+                                            <p:cond delay="0"/>
+                                          </p:stCondLst>
+                                        </p:cTn>
+                                        <p:tgtEl>
+                                          <p:spTgt spid="3">
+                                            <p:txEl>
+                                              <p:pRg st="7" end="7"/>
+                                            </p:txEl>
+                                          </p:spTgt>
+                                        </p:tgtEl>
+                                        <p:attrNameLst>
+                                          <p:attrName>style.visibility</p:attrName>
+                                        </p:attrNameLst>
+                                      </p:cBhvr>
+                                      <p:to>
+                                        <p:strVal val="visible"/>
+                                      </p:to>
+                                    </p:set>
+                                  </p:childTnLst>
+                                </p:cTn>
+                              </p:par>
+                            </p:childTnLst>
+                          </p:cTn>
+                        </p:par>
+                      </p:childTnLst>
+                    </p:cTn>
+                  </p:par>
+                </p:childTnLst>
+              </p:cTn>
+              <p:prevCondLst>
+                <p:cond evt="onPrev" delay="0">
+                  <p:tgtEl>
+                    <p:sldTgt/>
+                  </p:tgtEl>
+                </p:cond>
+              </p:prevCondLst>
+              <p:nextCondLst>
+                <p:cond evt="onNext" delay="0">
+                  <p:tgtEl>
+                    <p:sldTgt/>
+                  </p:tgtEl>
+                </p:cond>
+              </p:nextCondLst>
+            </p:seq>
+          </p:childTnLst>
+        </p:cTn>
+      </p:par>
+    </p:tnLst>
+  </p:timing>
+</p:sld>
+</file>
+
+<file path=ppt/slides/slide4.xml><?xml version="1.0" encoding="utf-8"?>
+<p:sld xmlns:a="http://schemas.openxmlformats.org/drawingml/2006/main" xmlns:r="http://schemas.openxmlformats.org/officeDocument/2006/relationships" xmlns:p="http://schemas.openxmlformats.org/presentationml/2006/main">
+  <p:cSld>
+    <p:spTree>
+      <p:nvGrpSpPr>
+        <p:cNvPr id="1" name=""/>
+        <p:cNvGrpSpPr/>
+        <p:nvPr/>
+      </p:nvGrpSpPr>
+      <p:grpSpPr>
+        <a:xfrm>
+          <a:off x="0" y="0"/>
+          <a:ext cx="0" cy="0"/>
+          <a:chOff x="0" y="0"/>
+          <a:chExt cx="0" cy="0"/>
+        </a:xfrm>
+      </p:grpSpPr>
+      <p:sp>
+        <p:nvSpPr>
           <p:cNvPr id="4" name="Rectangle 3"/>
           <p:cNvSpPr/>
           <p:nvPr/>
@@ -3552,7 +3983,15 @@
           <a:p>
             <a:r>
               <a:rPr lang="en-US" dirty="0" smtClean="0"/>
-              <a:t>Inspiration and slide: Dave </a:t>
+              <a:t>Inspiration and </a:t>
+            </a:r>
+            <a:r>
+              <a:rPr lang="en-US" dirty="0" smtClean="0"/>
+              <a:t>slides: </a:t>
+            </a:r>
+            <a:r>
+              <a:rPr lang="en-US" dirty="0" smtClean="0"/>
+              <a:t>Dave </a:t>
             </a:r>
             <a:r>
               <a:rPr lang="en-US" dirty="0" err="1" smtClean="0"/>
@@ -3582,7 +4021,7 @@
 </p:sld>
 </file>
 
-<file path=ppt/slides/slide4.xml><?xml version="1.0" encoding="utf-8"?>
+<file path=ppt/slides/slide5.xml><?xml version="1.0" encoding="utf-8"?>
 <p:sld xmlns:a="http://schemas.openxmlformats.org/drawingml/2006/main" xmlns:r="http://schemas.openxmlformats.org/officeDocument/2006/relationships" xmlns:p="http://schemas.openxmlformats.org/presentationml/2006/main">
   <p:cSld>
     <p:spTree>
@@ -4216,437 +4655,6 @@
 </p:sld>
 </file>
 
-<file path=ppt/slides/slide5.xml><?xml version="1.0" encoding="utf-8"?>
-<p:sld xmlns:a="http://schemas.openxmlformats.org/drawingml/2006/main" xmlns:r="http://schemas.openxmlformats.org/officeDocument/2006/relationships" xmlns:p="http://schemas.openxmlformats.org/presentationml/2006/main">
-  <p:cSld>
-    <p:spTree>
-      <p:nvGrpSpPr>
-        <p:cNvPr id="1" name=""/>
-        <p:cNvGrpSpPr/>
-        <p:nvPr/>
-      </p:nvGrpSpPr>
-      <p:grpSpPr>
-        <a:xfrm>
-          <a:off x="0" y="0"/>
-          <a:ext cx="0" cy="0"/>
-          <a:chOff x="0" y="0"/>
-          <a:chExt cx="0" cy="0"/>
-        </a:xfrm>
-      </p:grpSpPr>
-      <p:sp>
-        <p:nvSpPr>
-          <p:cNvPr id="2" name="Title 1"/>
-          <p:cNvSpPr>
-            <a:spLocks noGrp="1"/>
-          </p:cNvSpPr>
-          <p:nvPr>
-            <p:ph type="title"/>
-          </p:nvPr>
-        </p:nvSpPr>
-        <p:spPr>
-          <a:xfrm>
-            <a:off x="0" y="0"/>
-            <a:ext cx="8229600" cy="1143000"/>
-          </a:xfrm>
-        </p:spPr>
-        <p:txBody>
-          <a:bodyPr anchor="t">
-            <a:normAutofit/>
-          </a:bodyPr>
-          <a:lstStyle/>
-          <a:p>
-            <a:pPr algn="l"/>
-            <a:r>
-              <a:rPr lang="en-US" sz="3600" dirty="0" smtClean="0"/>
-              <a:t>Analysis is About Abstraction</a:t>
-            </a:r>
-            <a:endParaRPr lang="en-US" sz="3600" dirty="0"/>
-          </a:p>
-        </p:txBody>
-      </p:sp>
-      <p:sp>
-        <p:nvSpPr>
-          <p:cNvPr id="3" name="Content Placeholder 2"/>
-          <p:cNvSpPr>
-            <a:spLocks noGrp="1"/>
-          </p:cNvSpPr>
-          <p:nvPr>
-            <p:ph idx="1"/>
-          </p:nvPr>
-        </p:nvSpPr>
-        <p:spPr>
-          <a:xfrm>
-            <a:off x="457200" y="1600200"/>
-            <a:ext cx="8229600" cy="5257800"/>
-          </a:xfrm>
-        </p:spPr>
-        <p:txBody>
-          <a:bodyPr>
-            <a:normAutofit/>
-          </a:bodyPr>
-          <a:lstStyle/>
-          <a:p>
-            <a:pPr marL="457200" lvl="1" indent="0">
-              <a:buNone/>
-            </a:pPr>
-            <a:endParaRPr lang="en-US" sz="1800" dirty="0"/>
-          </a:p>
-          <a:p>
-            <a:r>
-              <a:rPr lang="en-US" sz="2000" dirty="0" smtClean="0"/>
-              <a:t>A variable is an abstraction:</a:t>
-            </a:r>
-          </a:p>
-          <a:p>
-            <a:pPr lvl="1"/>
-            <a:r>
-              <a:rPr lang="en-US" sz="1800" dirty="0" smtClean="0"/>
-              <a:t>We don’t want to think about a variable’s contents when we work with data</a:t>
-            </a:r>
-          </a:p>
-          <a:p>
-            <a:pPr lvl="2">
-              <a:buNone/>
-            </a:pPr>
-            <a:r>
-              <a:rPr lang="en-US" sz="1600" dirty="0" smtClean="0"/>
-              <a:t>e.g. </a:t>
-            </a:r>
-            <a:r>
-              <a:rPr lang="en-US" sz="1600" dirty="0" err="1" smtClean="0"/>
-              <a:t>spikewaveforms</a:t>
-            </a:r>
-            <a:r>
-              <a:rPr lang="en-US" sz="1600" dirty="0" smtClean="0"/>
-              <a:t>=</a:t>
-            </a:r>
-            <a:r>
-              <a:rPr lang="en-US" sz="1600" dirty="0" err="1" smtClean="0"/>
-              <a:t>loadwaveforms</a:t>
-            </a:r>
-            <a:r>
-              <a:rPr lang="en-US" sz="1600" dirty="0" smtClean="0"/>
-              <a:t>(</a:t>
-            </a:r>
-            <a:r>
-              <a:rPr lang="en-US" sz="1600" dirty="0" err="1" smtClean="0"/>
-              <a:t>spikedata</a:t>
-            </a:r>
-            <a:r>
-              <a:rPr lang="en-US" sz="1600" dirty="0" smtClean="0"/>
-              <a:t>);</a:t>
-            </a:r>
-          </a:p>
-          <a:p>
-            <a:pPr lvl="2"/>
-            <a:endParaRPr lang="en-US" sz="1600" dirty="0"/>
-          </a:p>
-          <a:p>
-            <a:r>
-              <a:rPr lang="en-US" sz="2000" dirty="0" smtClean="0"/>
-              <a:t>A function is an abstraction:</a:t>
-            </a:r>
-          </a:p>
-          <a:p>
-            <a:pPr lvl="1"/>
-            <a:r>
-              <a:rPr lang="en-US" sz="1800" dirty="0" smtClean="0"/>
-              <a:t>We don’t want to think about math when we perform an operation</a:t>
-            </a:r>
-          </a:p>
-          <a:p>
-            <a:pPr lvl="2">
-              <a:buNone/>
-            </a:pPr>
-            <a:r>
-              <a:rPr lang="en-US" sz="1600" dirty="0" smtClean="0"/>
-              <a:t>e.g. </a:t>
-            </a:r>
-            <a:r>
-              <a:rPr lang="en-US" sz="1600" dirty="0" err="1" smtClean="0"/>
-              <a:t>compute_place_fields</a:t>
-            </a:r>
-            <a:r>
-              <a:rPr lang="en-US" sz="1600" dirty="0" smtClean="0"/>
-              <a:t>(</a:t>
-            </a:r>
-            <a:r>
-              <a:rPr lang="en-US" sz="1600" dirty="0" err="1" smtClean="0"/>
-              <a:t>spikewaveforms</a:t>
-            </a:r>
-            <a:r>
-              <a:rPr lang="en-US" sz="1600" dirty="0" smtClean="0"/>
-              <a:t>)</a:t>
-            </a:r>
-            <a:endParaRPr lang="en-US" sz="2000" dirty="0"/>
-          </a:p>
-        </p:txBody>
-      </p:sp>
-    </p:spTree>
-    <p:extLst>
-      <p:ext uri="{BB962C8B-B14F-4D97-AF65-F5344CB8AC3E}">
-        <p14:creationId xmlns:p14="http://schemas.microsoft.com/office/powerpoint/2010/main" val="3582270256"/>
-      </p:ext>
-    </p:extLst>
-  </p:cSld>
-  <p:clrMapOvr>
-    <a:masterClrMapping/>
-  </p:clrMapOvr>
-  <p:timing>
-    <p:tnLst>
-      <p:par>
-        <p:cTn id="1" dur="indefinite" restart="never" nodeType="tmRoot">
-          <p:childTnLst>
-            <p:seq concurrent="1" nextAc="seek">
-              <p:cTn id="2" dur="indefinite" nodeType="mainSeq">
-                <p:childTnLst>
-                  <p:par>
-                    <p:cTn id="3" fill="hold">
-                      <p:stCondLst>
-                        <p:cond delay="indefinite"/>
-                      </p:stCondLst>
-                      <p:childTnLst>
-                        <p:par>
-                          <p:cTn id="4" fill="hold">
-                            <p:stCondLst>
-                              <p:cond delay="0"/>
-                            </p:stCondLst>
-                            <p:childTnLst>
-                              <p:par>
-                                <p:cTn id="5" presetID="1" presetClass="entr" presetSubtype="0" fill="hold" nodeType="clickEffect">
-                                  <p:stCondLst>
-                                    <p:cond delay="0"/>
-                                  </p:stCondLst>
-                                  <p:childTnLst>
-                                    <p:set>
-                                      <p:cBhvr>
-                                        <p:cTn id="6" dur="1" fill="hold">
-                                          <p:stCondLst>
-                                            <p:cond delay="0"/>
-                                          </p:stCondLst>
-                                        </p:cTn>
-                                        <p:tgtEl>
-                                          <p:spTgt spid="3">
-                                            <p:txEl>
-                                              <p:pRg st="1" end="1"/>
-                                            </p:txEl>
-                                          </p:spTgt>
-                                        </p:tgtEl>
-                                        <p:attrNameLst>
-                                          <p:attrName>style.visibility</p:attrName>
-                                        </p:attrNameLst>
-                                      </p:cBhvr>
-                                      <p:to>
-                                        <p:strVal val="visible"/>
-                                      </p:to>
-                                    </p:set>
-                                  </p:childTnLst>
-                                </p:cTn>
-                              </p:par>
-                              <p:par>
-                                <p:cTn id="7" presetID="1" presetClass="entr" presetSubtype="0" fill="hold" nodeType="withEffect">
-                                  <p:stCondLst>
-                                    <p:cond delay="0"/>
-                                  </p:stCondLst>
-                                  <p:childTnLst>
-                                    <p:set>
-                                      <p:cBhvr>
-                                        <p:cTn id="8" dur="1" fill="hold">
-                                          <p:stCondLst>
-                                            <p:cond delay="0"/>
-                                          </p:stCondLst>
-                                        </p:cTn>
-                                        <p:tgtEl>
-                                          <p:spTgt spid="3">
-                                            <p:txEl>
-                                              <p:pRg st="2" end="2"/>
-                                            </p:txEl>
-                                          </p:spTgt>
-                                        </p:tgtEl>
-                                        <p:attrNameLst>
-                                          <p:attrName>style.visibility</p:attrName>
-                                        </p:attrNameLst>
-                                      </p:cBhvr>
-                                      <p:to>
-                                        <p:strVal val="visible"/>
-                                      </p:to>
-                                    </p:set>
-                                  </p:childTnLst>
-                                </p:cTn>
-                              </p:par>
-                              <p:par>
-                                <p:cTn id="9" presetID="1" presetClass="entr" presetSubtype="0" fill="hold" nodeType="withEffect">
-                                  <p:stCondLst>
-                                    <p:cond delay="0"/>
-                                  </p:stCondLst>
-                                  <p:childTnLst>
-                                    <p:set>
-                                      <p:cBhvr>
-                                        <p:cTn id="10" dur="1" fill="hold">
-                                          <p:stCondLst>
-                                            <p:cond delay="0"/>
-                                          </p:stCondLst>
-                                        </p:cTn>
-                                        <p:tgtEl>
-                                          <p:spTgt spid="3">
-                                            <p:txEl>
-                                              <p:pRg st="3" end="3"/>
-                                            </p:txEl>
-                                          </p:spTgt>
-                                        </p:tgtEl>
-                                        <p:attrNameLst>
-                                          <p:attrName>style.visibility</p:attrName>
-                                        </p:attrNameLst>
-                                      </p:cBhvr>
-                                      <p:to>
-                                        <p:strVal val="visible"/>
-                                      </p:to>
-                                    </p:set>
-                                  </p:childTnLst>
-                                </p:cTn>
-                              </p:par>
-                            </p:childTnLst>
-                          </p:cTn>
-                        </p:par>
-                      </p:childTnLst>
-                    </p:cTn>
-                  </p:par>
-                  <p:par>
-                    <p:cTn id="11" fill="hold">
-                      <p:stCondLst>
-                        <p:cond delay="indefinite"/>
-                      </p:stCondLst>
-                      <p:childTnLst>
-                        <p:par>
-                          <p:cTn id="12" fill="hold">
-                            <p:stCondLst>
-                              <p:cond delay="0"/>
-                            </p:stCondLst>
-                            <p:childTnLst>
-                              <p:par>
-                                <p:cTn id="13" presetID="1" presetClass="entr" presetSubtype="0" fill="hold" nodeType="clickEffect">
-                                  <p:stCondLst>
-                                    <p:cond delay="0"/>
-                                  </p:stCondLst>
-                                  <p:childTnLst>
-                                    <p:set>
-                                      <p:cBhvr>
-                                        <p:cTn id="14" dur="1" fill="hold">
-                                          <p:stCondLst>
-                                            <p:cond delay="0"/>
-                                          </p:stCondLst>
-                                        </p:cTn>
-                                        <p:tgtEl>
-                                          <p:spTgt spid="3">
-                                            <p:txEl>
-                                              <p:pRg st="5" end="5"/>
-                                            </p:txEl>
-                                          </p:spTgt>
-                                        </p:tgtEl>
-                                        <p:attrNameLst>
-                                          <p:attrName>style.visibility</p:attrName>
-                                        </p:attrNameLst>
-                                      </p:cBhvr>
-                                      <p:to>
-                                        <p:strVal val="visible"/>
-                                      </p:to>
-                                    </p:set>
-                                  </p:childTnLst>
-                                </p:cTn>
-                              </p:par>
-                              <p:par>
-                                <p:cTn id="15" presetID="1" presetClass="entr" presetSubtype="0" fill="hold" nodeType="withEffect">
-                                  <p:stCondLst>
-                                    <p:cond delay="0"/>
-                                  </p:stCondLst>
-                                  <p:childTnLst>
-                                    <p:set>
-                                      <p:cBhvr>
-                                        <p:cTn id="16" dur="1" fill="hold">
-                                          <p:stCondLst>
-                                            <p:cond delay="0"/>
-                                          </p:stCondLst>
-                                        </p:cTn>
-                                        <p:tgtEl>
-                                          <p:spTgt spid="3">
-                                            <p:txEl>
-                                              <p:pRg st="6" end="6"/>
-                                            </p:txEl>
-                                          </p:spTgt>
-                                        </p:tgtEl>
-                                        <p:attrNameLst>
-                                          <p:attrName>style.visibility</p:attrName>
-                                        </p:attrNameLst>
-                                      </p:cBhvr>
-                                      <p:to>
-                                        <p:strVal val="visible"/>
-                                      </p:to>
-                                    </p:set>
-                                  </p:childTnLst>
-                                </p:cTn>
-                              </p:par>
-                              <p:par>
-                                <p:cTn id="17" presetID="1" presetClass="entr" presetSubtype="0" fill="hold" nodeType="withEffect">
-                                  <p:stCondLst>
-                                    <p:cond delay="0"/>
-                                  </p:stCondLst>
-                                  <p:childTnLst>
-                                    <p:set>
-                                      <p:cBhvr>
-                                        <p:cTn id="18" dur="1" fill="hold">
-                                          <p:stCondLst>
-                                            <p:cond delay="0"/>
-                                          </p:stCondLst>
-                                        </p:cTn>
-                                        <p:tgtEl>
-                                          <p:spTgt spid="3">
-                                            <p:txEl>
-                                              <p:pRg st="7" end="7"/>
-                                            </p:txEl>
-                                          </p:spTgt>
-                                        </p:tgtEl>
-                                        <p:attrNameLst>
-                                          <p:attrName>style.visibility</p:attrName>
-                                        </p:attrNameLst>
-                                      </p:cBhvr>
-                                      <p:to>
-                                        <p:strVal val="visible"/>
-                                      </p:to>
-                                    </p:set>
-                                  </p:childTnLst>
-                                </p:cTn>
-                              </p:par>
-                            </p:childTnLst>
-                          </p:cTn>
-                        </p:par>
-                      </p:childTnLst>
-                    </p:cTn>
-                  </p:par>
-                </p:childTnLst>
-              </p:cTn>
-              <p:prevCondLst>
-                <p:cond evt="onPrev" delay="0">
-                  <p:tgtEl>
-                    <p:sldTgt/>
-                  </p:tgtEl>
-                </p:cond>
-              </p:prevCondLst>
-              <p:nextCondLst>
-                <p:cond evt="onNext" delay="0">
-                  <p:tgtEl>
-                    <p:sldTgt/>
-                  </p:tgtEl>
-                </p:cond>
-              </p:nextCondLst>
-            </p:seq>
-          </p:childTnLst>
-        </p:cTn>
-      </p:par>
-    </p:tnLst>
-  </p:timing>
-</p:sld>
-</file>
-
 <file path=ppt/slides/slide6.xml><?xml version="1.0" encoding="utf-8"?>
 <p:sld xmlns:a="http://schemas.openxmlformats.org/drawingml/2006/main" xmlns:r="http://schemas.openxmlformats.org/officeDocument/2006/relationships" xmlns:p="http://schemas.openxmlformats.org/presentationml/2006/main">
   <p:cSld>

</xml_diff>